<commit_message>
Finished case study presentation
</commit_message>
<xml_diff>
--- a/Meetings/2. Case Study Period/2018-03-08 CaseStudyFrameworkLayoutPresentation.pptx
+++ b/Meetings/2. Case Study Period/2018-03-08 CaseStudyFrameworkLayoutPresentation.pptx
@@ -179,6 +179,10 @@
     </p:ext>
   </p:extLst>
 </p:presentation>
+</file>
+
+<file path=ppt/revisionInfo.xml><?xml version="1.0" encoding="utf-8"?>
+<p1510:revInfo xmlns:a="http://schemas.openxmlformats.org/drawingml/2006/main" xmlns:r="http://schemas.openxmlformats.org/officeDocument/2006/relationships" xmlns:p1510="http://schemas.microsoft.com/office/powerpoint/2015/10/main"/>
 </file>
 
 <file path=ppt/slideLayouts/slideLayout1.xml><?xml version="1.0" encoding="utf-8"?>
@@ -9237,14 +9241,14 @@
             <a:pPr lvl="1"/>
             <a:r>
               <a:rPr lang="en-US" dirty="0"/>
-              <a:t>Separate data</a:t>
+              <a:t>Separate datasets</a:t>
             </a:r>
           </a:p>
           <a:p>
             <a:pPr lvl="1"/>
             <a:r>
               <a:rPr lang="en-US" dirty="0"/>
-              <a:t>Joint set</a:t>
+              <a:t>Joint dataset</a:t>
             </a:r>
           </a:p>
           <a:p>
@@ -9338,6 +9342,42 @@
           </a:p>
         </p:txBody>
       </p:sp>
+      <p:pic>
+        <p:nvPicPr>
+          <p:cNvPr id="8" name="Picture 7">
+            <a:extLst>
+              <a:ext uri="{FF2B5EF4-FFF2-40B4-BE49-F238E27FC236}">
+                <a16:creationId xmlns:a16="http://schemas.microsoft.com/office/drawing/2014/main" id="{A1D4A3C3-3BEA-4612-ACC7-32981A78201B}"/>
+              </a:ext>
+            </a:extLst>
+          </p:cNvPr>
+          <p:cNvPicPr>
+            <a:picLocks noChangeAspect="1"/>
+          </p:cNvPicPr>
+          <p:nvPr/>
+        </p:nvPicPr>
+        <p:blipFill>
+          <a:blip r:embed="rId2" cstate="print">
+            <a:extLst>
+              <a:ext uri="{28A0092B-C50C-407E-A947-70E740481C1C}">
+                <a14:useLocalDpi xmlns:a14="http://schemas.microsoft.com/office/drawing/2010/main" val="0"/>
+              </a:ext>
+            </a:extLst>
+          </a:blip>
+          <a:stretch>
+            <a:fillRect/>
+          </a:stretch>
+        </p:blipFill>
+        <p:spPr>
+          <a:xfrm>
+            <a:off x="6240917" y="3087345"/>
+            <a:ext cx="5815281" cy="3005494"/>
+          </a:xfrm>
+          <a:prstGeom prst="rect">
+            <a:avLst/>
+          </a:prstGeom>
+        </p:spPr>
+      </p:pic>
     </p:spTree>
     <p:extLst>
       <p:ext uri="{BB962C8B-B14F-4D97-AF65-F5344CB8AC3E}">
@@ -9510,6 +9550,33 @@
                                   </p:childTnLst>
                                 </p:cTn>
                               </p:par>
+                              <p:par>
+                                <p:cTn id="15" presetID="1" presetClass="entr" presetSubtype="0" fill="hold" nodeType="withEffect">
+                                  <p:stCondLst>
+                                    <p:cond delay="0"/>
+                                  </p:stCondLst>
+                                  <p:childTnLst>
+                                    <p:set>
+                                      <p:cBhvr>
+                                        <p:cTn id="16" dur="1" fill="hold">
+                                          <p:stCondLst>
+                                            <p:cond delay="0"/>
+                                          </p:stCondLst>
+                                        </p:cTn>
+                                        <p:tgtEl>
+                                          <p:spTgt spid="8"/>
+                                        </p:tgtEl>
+                                        <p:attrNameLst>
+                                          <p:attrName>style.visibility</p:attrName>
+                                        </p:attrNameLst>
+                                      </p:cBhvr>
+                                      <p:to>
+                                        <p:strVal val="visible"/>
+                                      </p:to>
+                                    </p:set>
+                                  </p:childTnLst>
+                                </p:cTn>
+                              </p:par>
                             </p:childTnLst>
                           </p:cTn>
                         </p:par>
@@ -9517,26 +9584,26 @@
                     </p:cTn>
                   </p:par>
                   <p:par>
-                    <p:cTn id="15" fill="hold">
+                    <p:cTn id="17" fill="hold">
                       <p:stCondLst>
                         <p:cond delay="indefinite"/>
                       </p:stCondLst>
                       <p:childTnLst>
                         <p:par>
-                          <p:cTn id="16" fill="hold">
+                          <p:cTn id="18" fill="hold">
                             <p:stCondLst>
                               <p:cond delay="0"/>
                             </p:stCondLst>
                             <p:childTnLst>
                               <p:par>
-                                <p:cTn id="17" presetID="1" presetClass="entr" presetSubtype="0" fill="hold" grpId="0" nodeType="clickEffect">
+                                <p:cTn id="19" presetID="1" presetClass="entr" presetSubtype="0" fill="hold" grpId="0" nodeType="clickEffect">
                                   <p:stCondLst>
                                     <p:cond delay="0"/>
                                   </p:stCondLst>
                                   <p:childTnLst>
                                     <p:set>
                                       <p:cBhvr>
-                                        <p:cTn id="18" dur="1" fill="hold">
+                                        <p:cTn id="20" dur="1" fill="hold">
                                           <p:stCondLst>
                                             <p:cond delay="0"/>
                                           </p:stCondLst>
@@ -9560,14 +9627,14 @@
                                 </p:cTn>
                               </p:par>
                               <p:par>
-                                <p:cTn id="19" presetID="1" presetClass="entr" presetSubtype="0" fill="hold" grpId="0" nodeType="withEffect">
+                                <p:cTn id="21" presetID="1" presetClass="entr" presetSubtype="0" fill="hold" grpId="0" nodeType="withEffect">
                                   <p:stCondLst>
                                     <p:cond delay="0"/>
                                   </p:stCondLst>
                                   <p:childTnLst>
                                     <p:set>
                                       <p:cBhvr>
-                                        <p:cTn id="20" dur="1" fill="hold">
+                                        <p:cTn id="22" dur="1" fill="hold">
                                           <p:stCondLst>
                                             <p:cond delay="0"/>
                                           </p:stCondLst>
@@ -9591,14 +9658,14 @@
                                 </p:cTn>
                               </p:par>
                               <p:par>
-                                <p:cTn id="21" presetID="1" presetClass="entr" presetSubtype="0" fill="hold" grpId="0" nodeType="withEffect">
+                                <p:cTn id="23" presetID="1" presetClass="entr" presetSubtype="0" fill="hold" grpId="0" nodeType="withEffect">
                                   <p:stCondLst>
                                     <p:cond delay="0"/>
                                   </p:stCondLst>
                                   <p:childTnLst>
                                     <p:set>
                                       <p:cBhvr>
-                                        <p:cTn id="22" dur="1" fill="hold">
+                                        <p:cTn id="24" dur="1" fill="hold">
                                           <p:stCondLst>
                                             <p:cond delay="0"/>
                                           </p:stCondLst>
@@ -10394,7 +10461,7 @@
           <a:p>
             <a:r>
               <a:rPr lang="en-US" dirty="0"/>
-              <a:t>Standardization</a:t>
+              <a:t>Normalization</a:t>
             </a:r>
           </a:p>
           <a:p>

</xml_diff>